<commit_message>
Update to manuscript draft
- responded to methods/results comments
</commit_message>
<xml_diff>
--- a/report/drafting/3_28_2024/Figures/Figure 2.pptx
+++ b/report/drafting/3_28_2024/Figures/Figure 2.pptx
@@ -6,6 +6,7 @@
   </p:sldMasterIdLst>
   <p:sldIdLst>
     <p:sldId id="256" r:id="rId2"/>
+    <p:sldId id="257" r:id="rId3"/>
   </p:sldIdLst>
   <p:sldSz cx="12192000" cy="6858000"/>
   <p:notesSz cx="6858000" cy="9144000"/>
@@ -259,7 +260,7 @@
           <a:p>
             <a:fld id="{10EB7D7B-3DC6-4E17-8D75-EDA7E0961AEB}" type="datetimeFigureOut">
               <a:rPr lang="en-US" smtClean="0"/>
-              <a:t>3/1/2024</a:t>
+              <a:t>4/3/2024</a:t>
             </a:fld>
             <a:endParaRPr lang="en-US"/>
           </a:p>
@@ -457,7 +458,7 @@
           <a:p>
             <a:fld id="{10EB7D7B-3DC6-4E17-8D75-EDA7E0961AEB}" type="datetimeFigureOut">
               <a:rPr lang="en-US" smtClean="0"/>
-              <a:t>3/1/2024</a:t>
+              <a:t>4/3/2024</a:t>
             </a:fld>
             <a:endParaRPr lang="en-US"/>
           </a:p>
@@ -665,7 +666,7 @@
           <a:p>
             <a:fld id="{10EB7D7B-3DC6-4E17-8D75-EDA7E0961AEB}" type="datetimeFigureOut">
               <a:rPr lang="en-US" smtClean="0"/>
-              <a:t>3/1/2024</a:t>
+              <a:t>4/3/2024</a:t>
             </a:fld>
             <a:endParaRPr lang="en-US"/>
           </a:p>
@@ -863,7 +864,7 @@
           <a:p>
             <a:fld id="{10EB7D7B-3DC6-4E17-8D75-EDA7E0961AEB}" type="datetimeFigureOut">
               <a:rPr lang="en-US" smtClean="0"/>
-              <a:t>3/1/2024</a:t>
+              <a:t>4/3/2024</a:t>
             </a:fld>
             <a:endParaRPr lang="en-US"/>
           </a:p>
@@ -1138,7 +1139,7 @@
           <a:p>
             <a:fld id="{10EB7D7B-3DC6-4E17-8D75-EDA7E0961AEB}" type="datetimeFigureOut">
               <a:rPr lang="en-US" smtClean="0"/>
-              <a:t>3/1/2024</a:t>
+              <a:t>4/3/2024</a:t>
             </a:fld>
             <a:endParaRPr lang="en-US"/>
           </a:p>
@@ -1403,7 +1404,7 @@
           <a:p>
             <a:fld id="{10EB7D7B-3DC6-4E17-8D75-EDA7E0961AEB}" type="datetimeFigureOut">
               <a:rPr lang="en-US" smtClean="0"/>
-              <a:t>3/1/2024</a:t>
+              <a:t>4/3/2024</a:t>
             </a:fld>
             <a:endParaRPr lang="en-US"/>
           </a:p>
@@ -1815,7 +1816,7 @@
           <a:p>
             <a:fld id="{10EB7D7B-3DC6-4E17-8D75-EDA7E0961AEB}" type="datetimeFigureOut">
               <a:rPr lang="en-US" smtClean="0"/>
-              <a:t>3/1/2024</a:t>
+              <a:t>4/3/2024</a:t>
             </a:fld>
             <a:endParaRPr lang="en-US"/>
           </a:p>
@@ -1956,7 +1957,7 @@
           <a:p>
             <a:fld id="{10EB7D7B-3DC6-4E17-8D75-EDA7E0961AEB}" type="datetimeFigureOut">
               <a:rPr lang="en-US" smtClean="0"/>
-              <a:t>3/1/2024</a:t>
+              <a:t>4/3/2024</a:t>
             </a:fld>
             <a:endParaRPr lang="en-US"/>
           </a:p>
@@ -2069,7 +2070,7 @@
           <a:p>
             <a:fld id="{10EB7D7B-3DC6-4E17-8D75-EDA7E0961AEB}" type="datetimeFigureOut">
               <a:rPr lang="en-US" smtClean="0"/>
-              <a:t>3/1/2024</a:t>
+              <a:t>4/3/2024</a:t>
             </a:fld>
             <a:endParaRPr lang="en-US"/>
           </a:p>
@@ -2380,7 +2381,7 @@
           <a:p>
             <a:fld id="{10EB7D7B-3DC6-4E17-8D75-EDA7E0961AEB}" type="datetimeFigureOut">
               <a:rPr lang="en-US" smtClean="0"/>
-              <a:t>3/1/2024</a:t>
+              <a:t>4/3/2024</a:t>
             </a:fld>
             <a:endParaRPr lang="en-US"/>
           </a:p>
@@ -2668,7 +2669,7 @@
           <a:p>
             <a:fld id="{10EB7D7B-3DC6-4E17-8D75-EDA7E0961AEB}" type="datetimeFigureOut">
               <a:rPr lang="en-US" smtClean="0"/>
-              <a:t>3/1/2024</a:t>
+              <a:t>4/3/2024</a:t>
             </a:fld>
             <a:endParaRPr lang="en-US"/>
           </a:p>
@@ -2909,7 +2910,7 @@
           <a:p>
             <a:fld id="{10EB7D7B-3DC6-4E17-8D75-EDA7E0961AEB}" type="datetimeFigureOut">
               <a:rPr lang="en-US" smtClean="0"/>
-              <a:t>3/1/2024</a:t>
+              <a:t>4/3/2024</a:t>
             </a:fld>
             <a:endParaRPr lang="en-US"/>
           </a:p>
@@ -4565,6 +4566,1686 @@
     <p:extLst>
       <p:ext uri="{BB962C8B-B14F-4D97-AF65-F5344CB8AC3E}">
         <p14:creationId xmlns:p14="http://schemas.microsoft.com/office/powerpoint/2010/main" val="1760886206"/>
+      </p:ext>
+    </p:extLst>
+  </p:cSld>
+  <p:clrMapOvr>
+    <a:masterClrMapping/>
+  </p:clrMapOvr>
+</p:sld>
+</file>
+
+<file path=ppt/slides/slide2.xml><?xml version="1.0" encoding="utf-8"?>
+<p:sld xmlns:a="http://schemas.openxmlformats.org/drawingml/2006/main" xmlns:r="http://schemas.openxmlformats.org/officeDocument/2006/relationships" xmlns:p="http://schemas.openxmlformats.org/presentationml/2006/main">
+  <p:cSld>
+    <p:spTree>
+      <p:nvGrpSpPr>
+        <p:cNvPr id="1" name=""/>
+        <p:cNvGrpSpPr/>
+        <p:nvPr/>
+      </p:nvGrpSpPr>
+      <p:grpSpPr>
+        <a:xfrm>
+          <a:off x="0" y="0"/>
+          <a:ext cx="0" cy="0"/>
+          <a:chOff x="0" y="0"/>
+          <a:chExt cx="0" cy="0"/>
+        </a:xfrm>
+      </p:grpSpPr>
+      <p:sp>
+        <p:nvSpPr>
+          <p:cNvPr id="31" name="Rectangle 30">
+            <a:extLst>
+              <a:ext uri="{FF2B5EF4-FFF2-40B4-BE49-F238E27FC236}">
+                <a16:creationId xmlns:a16="http://schemas.microsoft.com/office/drawing/2014/main" id="{1B7A57DA-E6AB-8CED-F69C-6DDDDC139188}"/>
+              </a:ext>
+            </a:extLst>
+          </p:cNvPr>
+          <p:cNvSpPr/>
+          <p:nvPr/>
+        </p:nvSpPr>
+        <p:spPr>
+          <a:xfrm>
+            <a:off x="849241" y="4108830"/>
+            <a:ext cx="1491296" cy="540920"/>
+          </a:xfrm>
+          <a:prstGeom prst="rect">
+            <a:avLst/>
+          </a:prstGeom>
+        </p:spPr>
+        <p:style>
+          <a:lnRef idx="2">
+            <a:schemeClr val="accent1">
+              <a:shade val="15000"/>
+            </a:schemeClr>
+          </a:lnRef>
+          <a:fillRef idx="1">
+            <a:schemeClr val="accent1"/>
+          </a:fillRef>
+          <a:effectRef idx="0">
+            <a:schemeClr val="accent1"/>
+          </a:effectRef>
+          <a:fontRef idx="minor">
+            <a:schemeClr val="lt1"/>
+          </a:fontRef>
+        </p:style>
+        <p:txBody>
+          <a:bodyPr rtlCol="0" anchor="ctr"/>
+          <a:lstStyle/>
+          <a:p>
+            <a:pPr algn="ctr"/>
+            <a:r>
+              <a:rPr lang="en-US" sz="1200"/>
+              <a:t>n-layer LSTM</a:t>
+            </a:r>
+            <a:endParaRPr lang="en-US" sz="1200" dirty="0"/>
+          </a:p>
+        </p:txBody>
+      </p:sp>
+      <p:sp>
+        <p:nvSpPr>
+          <p:cNvPr id="32" name="Rectangle 31">
+            <a:extLst>
+              <a:ext uri="{FF2B5EF4-FFF2-40B4-BE49-F238E27FC236}">
+                <a16:creationId xmlns:a16="http://schemas.microsoft.com/office/drawing/2014/main" id="{90E53804-3D54-AB32-023A-BFC0D8809017}"/>
+              </a:ext>
+            </a:extLst>
+          </p:cNvPr>
+          <p:cNvSpPr/>
+          <p:nvPr/>
+        </p:nvSpPr>
+        <p:spPr>
+          <a:xfrm>
+            <a:off x="849241" y="3508025"/>
+            <a:ext cx="1491296" cy="358292"/>
+          </a:xfrm>
+          <a:prstGeom prst="rect">
+            <a:avLst/>
+          </a:prstGeom>
+        </p:spPr>
+        <p:style>
+          <a:lnRef idx="2">
+            <a:schemeClr val="accent1">
+              <a:shade val="15000"/>
+            </a:schemeClr>
+          </a:lnRef>
+          <a:fillRef idx="1">
+            <a:schemeClr val="accent1"/>
+          </a:fillRef>
+          <a:effectRef idx="0">
+            <a:schemeClr val="accent1"/>
+          </a:effectRef>
+          <a:fontRef idx="minor">
+            <a:schemeClr val="lt1"/>
+          </a:fontRef>
+        </p:style>
+        <p:txBody>
+          <a:bodyPr rtlCol="0" anchor="ctr"/>
+          <a:lstStyle/>
+          <a:p>
+            <a:pPr algn="ctr"/>
+            <a:r>
+              <a:rPr lang="en-US" sz="1200" dirty="0"/>
+              <a:t>Single-layer FF</a:t>
+            </a:r>
+          </a:p>
+        </p:txBody>
+      </p:sp>
+      <p:cxnSp>
+        <p:nvCxnSpPr>
+          <p:cNvPr id="33" name="Straight Arrow Connector 32">
+            <a:extLst>
+              <a:ext uri="{FF2B5EF4-FFF2-40B4-BE49-F238E27FC236}">
+                <a16:creationId xmlns:a16="http://schemas.microsoft.com/office/drawing/2014/main" id="{688844D2-A1A5-CF8C-33CC-E8A046EDBBAC}"/>
+              </a:ext>
+            </a:extLst>
+          </p:cNvPr>
+          <p:cNvCxnSpPr>
+            <a:cxnSpLocks/>
+            <a:stCxn id="31" idx="0"/>
+            <a:endCxn id="32" idx="2"/>
+          </p:cNvCxnSpPr>
+          <p:nvPr/>
+        </p:nvCxnSpPr>
+        <p:spPr>
+          <a:xfrm flipV="1">
+            <a:off x="1594889" y="3866317"/>
+            <a:ext cx="0" cy="242513"/>
+          </a:xfrm>
+          <a:prstGeom prst="straightConnector1">
+            <a:avLst/>
+          </a:prstGeom>
+          <a:ln>
+            <a:tailEnd type="triangle"/>
+          </a:ln>
+        </p:spPr>
+        <p:style>
+          <a:lnRef idx="1">
+            <a:schemeClr val="accent1"/>
+          </a:lnRef>
+          <a:fillRef idx="0">
+            <a:schemeClr val="accent1"/>
+          </a:fillRef>
+          <a:effectRef idx="0">
+            <a:schemeClr val="accent1"/>
+          </a:effectRef>
+          <a:fontRef idx="minor">
+            <a:schemeClr val="tx1"/>
+          </a:fontRef>
+        </p:style>
+      </p:cxnSp>
+      <p:cxnSp>
+        <p:nvCxnSpPr>
+          <p:cNvPr id="34" name="Straight Arrow Connector 33">
+            <a:extLst>
+              <a:ext uri="{FF2B5EF4-FFF2-40B4-BE49-F238E27FC236}">
+                <a16:creationId xmlns:a16="http://schemas.microsoft.com/office/drawing/2014/main" id="{D07A6BA0-4202-0811-351B-150A4D48445B}"/>
+              </a:ext>
+            </a:extLst>
+          </p:cNvPr>
+          <p:cNvCxnSpPr>
+            <a:cxnSpLocks/>
+            <a:stCxn id="32" idx="0"/>
+            <a:endCxn id="35" idx="2"/>
+          </p:cNvCxnSpPr>
+          <p:nvPr/>
+        </p:nvCxnSpPr>
+        <p:spPr>
+          <a:xfrm flipV="1">
+            <a:off x="1594889" y="3325397"/>
+            <a:ext cx="0" cy="182628"/>
+          </a:xfrm>
+          <a:prstGeom prst="straightConnector1">
+            <a:avLst/>
+          </a:prstGeom>
+          <a:ln>
+            <a:tailEnd type="triangle"/>
+          </a:ln>
+        </p:spPr>
+        <p:style>
+          <a:lnRef idx="1">
+            <a:schemeClr val="accent1"/>
+          </a:lnRef>
+          <a:fillRef idx="0">
+            <a:schemeClr val="accent1"/>
+          </a:fillRef>
+          <a:effectRef idx="0">
+            <a:schemeClr val="accent1"/>
+          </a:effectRef>
+          <a:fontRef idx="minor">
+            <a:schemeClr val="tx1"/>
+          </a:fontRef>
+        </p:style>
+      </p:cxnSp>
+      <p:sp>
+        <p:nvSpPr>
+          <p:cNvPr id="35" name="TextBox 34">
+            <a:extLst>
+              <a:ext uri="{FF2B5EF4-FFF2-40B4-BE49-F238E27FC236}">
+                <a16:creationId xmlns:a16="http://schemas.microsoft.com/office/drawing/2014/main" id="{287B5CA8-AAC7-73B8-25E8-0E3E96171273}"/>
+              </a:ext>
+            </a:extLst>
+          </p:cNvPr>
+          <p:cNvSpPr txBox="1"/>
+          <p:nvPr/>
+        </p:nvSpPr>
+        <p:spPr>
+          <a:xfrm>
+            <a:off x="840516" y="3048398"/>
+            <a:ext cx="1508746" cy="276999"/>
+          </a:xfrm>
+          <a:prstGeom prst="rect">
+            <a:avLst/>
+          </a:prstGeom>
+          <a:noFill/>
+        </p:spPr>
+        <p:txBody>
+          <a:bodyPr wrap="none" rtlCol="0">
+            <a:spAutoFit/>
+          </a:bodyPr>
+          <a:lstStyle/>
+          <a:p>
+            <a:r>
+              <a:rPr lang="en-US" sz="1200" dirty="0"/>
+              <a:t>[predicted release]</a:t>
+            </a:r>
+          </a:p>
+        </p:txBody>
+      </p:sp>
+      <p:sp>
+        <p:nvSpPr>
+          <p:cNvPr id="36" name="TextBox 35">
+            <a:extLst>
+              <a:ext uri="{FF2B5EF4-FFF2-40B4-BE49-F238E27FC236}">
+                <a16:creationId xmlns:a16="http://schemas.microsoft.com/office/drawing/2014/main" id="{099FB6A9-08CB-0736-1ED3-606B1FD8548B}"/>
+              </a:ext>
+            </a:extLst>
+          </p:cNvPr>
+          <p:cNvSpPr txBox="1"/>
+          <p:nvPr/>
+        </p:nvSpPr>
+        <p:spPr>
+          <a:xfrm>
+            <a:off x="1042173" y="4869531"/>
+            <a:ext cx="1105431" cy="276999"/>
+          </a:xfrm>
+          <a:prstGeom prst="rect">
+            <a:avLst/>
+          </a:prstGeom>
+          <a:noFill/>
+        </p:spPr>
+        <p:txBody>
+          <a:bodyPr wrap="none" rtlCol="0">
+            <a:spAutoFit/>
+          </a:bodyPr>
+          <a:lstStyle/>
+          <a:p>
+            <a:r>
+              <a:rPr lang="en-US" sz="1200"/>
+              <a:t>[inflow, DOY]</a:t>
+            </a:r>
+            <a:endParaRPr lang="en-US" sz="1200" dirty="0"/>
+          </a:p>
+        </p:txBody>
+      </p:sp>
+      <p:cxnSp>
+        <p:nvCxnSpPr>
+          <p:cNvPr id="37" name="Straight Arrow Connector 36">
+            <a:extLst>
+              <a:ext uri="{FF2B5EF4-FFF2-40B4-BE49-F238E27FC236}">
+                <a16:creationId xmlns:a16="http://schemas.microsoft.com/office/drawing/2014/main" id="{6A4B6B2D-30A4-5677-B1ED-59BBDC1C7980}"/>
+              </a:ext>
+            </a:extLst>
+          </p:cNvPr>
+          <p:cNvCxnSpPr>
+            <a:cxnSpLocks/>
+            <a:stCxn id="36" idx="0"/>
+            <a:endCxn id="31" idx="2"/>
+          </p:cNvCxnSpPr>
+          <p:nvPr/>
+        </p:nvCxnSpPr>
+        <p:spPr>
+          <a:xfrm flipV="1">
+            <a:off x="1594889" y="4649750"/>
+            <a:ext cx="0" cy="219781"/>
+          </a:xfrm>
+          <a:prstGeom prst="straightConnector1">
+            <a:avLst/>
+          </a:prstGeom>
+          <a:ln>
+            <a:tailEnd type="triangle"/>
+          </a:ln>
+        </p:spPr>
+        <p:style>
+          <a:lnRef idx="1">
+            <a:schemeClr val="accent1"/>
+          </a:lnRef>
+          <a:fillRef idx="0">
+            <a:schemeClr val="accent1"/>
+          </a:fillRef>
+          <a:effectRef idx="0">
+            <a:schemeClr val="accent1"/>
+          </a:effectRef>
+          <a:fontRef idx="minor">
+            <a:schemeClr val="tx1"/>
+          </a:fontRef>
+        </p:style>
+      </p:cxnSp>
+      <p:sp>
+        <p:nvSpPr>
+          <p:cNvPr id="38" name="TextBox 37">
+            <a:extLst>
+              <a:ext uri="{FF2B5EF4-FFF2-40B4-BE49-F238E27FC236}">
+                <a16:creationId xmlns:a16="http://schemas.microsoft.com/office/drawing/2014/main" id="{66E257E7-2477-882C-02C8-1588D86C6875}"/>
+              </a:ext>
+            </a:extLst>
+          </p:cNvPr>
+          <p:cNvSpPr txBox="1"/>
+          <p:nvPr/>
+        </p:nvSpPr>
+        <p:spPr>
+          <a:xfrm>
+            <a:off x="871077" y="2277976"/>
+            <a:ext cx="1269194" cy="553998"/>
+          </a:xfrm>
+          <a:prstGeom prst="rect">
+            <a:avLst/>
+          </a:prstGeom>
+          <a:noFill/>
+        </p:spPr>
+        <p:txBody>
+          <a:bodyPr wrap="none" rtlCol="0">
+            <a:spAutoFit/>
+          </a:bodyPr>
+          <a:lstStyle/>
+          <a:p>
+            <a:pPr algn="ctr"/>
+            <a:r>
+              <a:rPr lang="en-US" dirty="0"/>
+              <a:t>MODEL 1</a:t>
+            </a:r>
+          </a:p>
+          <a:p>
+            <a:pPr algn="ctr"/>
+            <a:r>
+              <a:rPr lang="en-US" sz="1200" dirty="0"/>
+              <a:t>Standard LSTM</a:t>
+            </a:r>
+          </a:p>
+        </p:txBody>
+      </p:sp>
+      <p:sp>
+        <p:nvSpPr>
+          <p:cNvPr id="39" name="Rectangle 38">
+            <a:extLst>
+              <a:ext uri="{FF2B5EF4-FFF2-40B4-BE49-F238E27FC236}">
+                <a16:creationId xmlns:a16="http://schemas.microsoft.com/office/drawing/2014/main" id="{C8672024-08BD-ADB4-94DE-5B346FF1DE6F}"/>
+              </a:ext>
+            </a:extLst>
+          </p:cNvPr>
+          <p:cNvSpPr/>
+          <p:nvPr/>
+        </p:nvSpPr>
+        <p:spPr>
+          <a:xfrm>
+            <a:off x="2946449" y="4108830"/>
+            <a:ext cx="1491296" cy="540920"/>
+          </a:xfrm>
+          <a:prstGeom prst="rect">
+            <a:avLst/>
+          </a:prstGeom>
+        </p:spPr>
+        <p:style>
+          <a:lnRef idx="2">
+            <a:schemeClr val="accent1">
+              <a:shade val="15000"/>
+            </a:schemeClr>
+          </a:lnRef>
+          <a:fillRef idx="1">
+            <a:schemeClr val="accent1"/>
+          </a:fillRef>
+          <a:effectRef idx="0">
+            <a:schemeClr val="accent1"/>
+          </a:effectRef>
+          <a:fontRef idx="minor">
+            <a:schemeClr val="lt1"/>
+          </a:fontRef>
+        </p:style>
+        <p:txBody>
+          <a:bodyPr rtlCol="0" anchor="ctr"/>
+          <a:lstStyle/>
+          <a:p>
+            <a:pPr algn="ctr"/>
+            <a:r>
+              <a:rPr lang="en-US" sz="1200"/>
+              <a:t>n-layer LSTM</a:t>
+            </a:r>
+            <a:endParaRPr lang="en-US" sz="1200" dirty="0"/>
+          </a:p>
+        </p:txBody>
+      </p:sp>
+      <p:sp>
+        <p:nvSpPr>
+          <p:cNvPr id="40" name="Rectangle 39">
+            <a:extLst>
+              <a:ext uri="{FF2B5EF4-FFF2-40B4-BE49-F238E27FC236}">
+                <a16:creationId xmlns:a16="http://schemas.microsoft.com/office/drawing/2014/main" id="{F0BE432A-2755-CFB9-5C5B-CF959B83C2D2}"/>
+              </a:ext>
+            </a:extLst>
+          </p:cNvPr>
+          <p:cNvSpPr/>
+          <p:nvPr/>
+        </p:nvSpPr>
+        <p:spPr>
+          <a:xfrm>
+            <a:off x="2946449" y="3508025"/>
+            <a:ext cx="1491296" cy="358292"/>
+          </a:xfrm>
+          <a:prstGeom prst="rect">
+            <a:avLst/>
+          </a:prstGeom>
+        </p:spPr>
+        <p:style>
+          <a:lnRef idx="2">
+            <a:schemeClr val="accent1">
+              <a:shade val="15000"/>
+            </a:schemeClr>
+          </a:lnRef>
+          <a:fillRef idx="1">
+            <a:schemeClr val="accent1"/>
+          </a:fillRef>
+          <a:effectRef idx="0">
+            <a:schemeClr val="accent1"/>
+          </a:effectRef>
+          <a:fontRef idx="minor">
+            <a:schemeClr val="lt1"/>
+          </a:fontRef>
+        </p:style>
+        <p:txBody>
+          <a:bodyPr rtlCol="0" anchor="ctr"/>
+          <a:lstStyle/>
+          <a:p>
+            <a:pPr algn="ctr"/>
+            <a:r>
+              <a:rPr lang="en-US" sz="1200" dirty="0"/>
+              <a:t>Single-layer FF</a:t>
+            </a:r>
+          </a:p>
+        </p:txBody>
+      </p:sp>
+      <p:cxnSp>
+        <p:nvCxnSpPr>
+          <p:cNvPr id="41" name="Straight Arrow Connector 40">
+            <a:extLst>
+              <a:ext uri="{FF2B5EF4-FFF2-40B4-BE49-F238E27FC236}">
+                <a16:creationId xmlns:a16="http://schemas.microsoft.com/office/drawing/2014/main" id="{2DB10382-A884-5B53-5FDB-6229429A3190}"/>
+              </a:ext>
+            </a:extLst>
+          </p:cNvPr>
+          <p:cNvCxnSpPr>
+            <a:cxnSpLocks/>
+            <a:stCxn id="39" idx="0"/>
+            <a:endCxn id="40" idx="2"/>
+          </p:cNvCxnSpPr>
+          <p:nvPr/>
+        </p:nvCxnSpPr>
+        <p:spPr>
+          <a:xfrm flipV="1">
+            <a:off x="3692097" y="3866317"/>
+            <a:ext cx="0" cy="242513"/>
+          </a:xfrm>
+          <a:prstGeom prst="straightConnector1">
+            <a:avLst/>
+          </a:prstGeom>
+          <a:ln>
+            <a:tailEnd type="triangle"/>
+          </a:ln>
+        </p:spPr>
+        <p:style>
+          <a:lnRef idx="1">
+            <a:schemeClr val="accent1"/>
+          </a:lnRef>
+          <a:fillRef idx="0">
+            <a:schemeClr val="accent1"/>
+          </a:fillRef>
+          <a:effectRef idx="0">
+            <a:schemeClr val="accent1"/>
+          </a:effectRef>
+          <a:fontRef idx="minor">
+            <a:schemeClr val="tx1"/>
+          </a:fontRef>
+        </p:style>
+      </p:cxnSp>
+      <p:cxnSp>
+        <p:nvCxnSpPr>
+          <p:cNvPr id="42" name="Straight Arrow Connector 41">
+            <a:extLst>
+              <a:ext uri="{FF2B5EF4-FFF2-40B4-BE49-F238E27FC236}">
+                <a16:creationId xmlns:a16="http://schemas.microsoft.com/office/drawing/2014/main" id="{C01876C6-7632-6A12-BA31-43D71FA911D9}"/>
+              </a:ext>
+            </a:extLst>
+          </p:cNvPr>
+          <p:cNvCxnSpPr>
+            <a:cxnSpLocks/>
+            <a:stCxn id="40" idx="0"/>
+            <a:endCxn id="43" idx="2"/>
+          </p:cNvCxnSpPr>
+          <p:nvPr/>
+        </p:nvCxnSpPr>
+        <p:spPr>
+          <a:xfrm flipH="1" flipV="1">
+            <a:off x="3692096" y="3325396"/>
+            <a:ext cx="1" cy="182629"/>
+          </a:xfrm>
+          <a:prstGeom prst="straightConnector1">
+            <a:avLst/>
+          </a:prstGeom>
+          <a:ln>
+            <a:tailEnd type="triangle"/>
+          </a:ln>
+        </p:spPr>
+        <p:style>
+          <a:lnRef idx="1">
+            <a:schemeClr val="accent1"/>
+          </a:lnRef>
+          <a:fillRef idx="0">
+            <a:schemeClr val="accent1"/>
+          </a:fillRef>
+          <a:effectRef idx="0">
+            <a:schemeClr val="accent1"/>
+          </a:effectRef>
+          <a:fontRef idx="minor">
+            <a:schemeClr val="tx1"/>
+          </a:fontRef>
+        </p:style>
+      </p:cxnSp>
+      <p:sp>
+        <p:nvSpPr>
+          <p:cNvPr id="43" name="TextBox 42">
+            <a:extLst>
+              <a:ext uri="{FF2B5EF4-FFF2-40B4-BE49-F238E27FC236}">
+                <a16:creationId xmlns:a16="http://schemas.microsoft.com/office/drawing/2014/main" id="{75643F9B-729B-4621-B264-B4EE6F716D3F}"/>
+              </a:ext>
+            </a:extLst>
+          </p:cNvPr>
+          <p:cNvSpPr txBox="1"/>
+          <p:nvPr/>
+        </p:nvSpPr>
+        <p:spPr>
+          <a:xfrm>
+            <a:off x="2937723" y="3048397"/>
+            <a:ext cx="1508746" cy="276999"/>
+          </a:xfrm>
+          <a:prstGeom prst="rect">
+            <a:avLst/>
+          </a:prstGeom>
+          <a:noFill/>
+        </p:spPr>
+        <p:txBody>
+          <a:bodyPr wrap="none" rtlCol="0">
+            <a:spAutoFit/>
+          </a:bodyPr>
+          <a:lstStyle/>
+          <a:p>
+            <a:r>
+              <a:rPr lang="en-US" sz="1200" dirty="0"/>
+              <a:t>[predicted release]</a:t>
+            </a:r>
+          </a:p>
+        </p:txBody>
+      </p:sp>
+      <p:sp>
+        <p:nvSpPr>
+          <p:cNvPr id="44" name="TextBox 43">
+            <a:extLst>
+              <a:ext uri="{FF2B5EF4-FFF2-40B4-BE49-F238E27FC236}">
+                <a16:creationId xmlns:a16="http://schemas.microsoft.com/office/drawing/2014/main" id="{E434B9F9-20D2-457F-4263-F6F32DE08C0A}"/>
+              </a:ext>
+            </a:extLst>
+          </p:cNvPr>
+          <p:cNvSpPr txBox="1"/>
+          <p:nvPr/>
+        </p:nvSpPr>
+        <p:spPr>
+          <a:xfrm>
+            <a:off x="3139381" y="4845169"/>
+            <a:ext cx="1105431" cy="276999"/>
+          </a:xfrm>
+          <a:prstGeom prst="rect">
+            <a:avLst/>
+          </a:prstGeom>
+          <a:noFill/>
+        </p:spPr>
+        <p:txBody>
+          <a:bodyPr wrap="none" rtlCol="0">
+            <a:spAutoFit/>
+          </a:bodyPr>
+          <a:lstStyle/>
+          <a:p>
+            <a:r>
+              <a:rPr lang="en-US" sz="1200"/>
+              <a:t>[inflow, DOY]</a:t>
+            </a:r>
+            <a:endParaRPr lang="en-US" sz="1200" dirty="0"/>
+          </a:p>
+        </p:txBody>
+      </p:sp>
+      <p:cxnSp>
+        <p:nvCxnSpPr>
+          <p:cNvPr id="45" name="Straight Arrow Connector 44">
+            <a:extLst>
+              <a:ext uri="{FF2B5EF4-FFF2-40B4-BE49-F238E27FC236}">
+                <a16:creationId xmlns:a16="http://schemas.microsoft.com/office/drawing/2014/main" id="{3E4A7DE9-502D-09F1-4825-208BBD8E6830}"/>
+              </a:ext>
+            </a:extLst>
+          </p:cNvPr>
+          <p:cNvCxnSpPr>
+            <a:cxnSpLocks/>
+            <a:stCxn id="44" idx="0"/>
+            <a:endCxn id="39" idx="2"/>
+          </p:cNvCxnSpPr>
+          <p:nvPr/>
+        </p:nvCxnSpPr>
+        <p:spPr>
+          <a:xfrm flipV="1">
+            <a:off x="3692097" y="4649750"/>
+            <a:ext cx="0" cy="195419"/>
+          </a:xfrm>
+          <a:prstGeom prst="straightConnector1">
+            <a:avLst/>
+          </a:prstGeom>
+          <a:ln>
+            <a:tailEnd type="triangle"/>
+          </a:ln>
+        </p:spPr>
+        <p:style>
+          <a:lnRef idx="1">
+            <a:schemeClr val="accent1"/>
+          </a:lnRef>
+          <a:fillRef idx="0">
+            <a:schemeClr val="accent1"/>
+          </a:fillRef>
+          <a:effectRef idx="0">
+            <a:schemeClr val="accent1"/>
+          </a:effectRef>
+          <a:fontRef idx="minor">
+            <a:schemeClr val="tx1"/>
+          </a:fontRef>
+        </p:style>
+      </p:cxnSp>
+      <p:sp>
+        <p:nvSpPr>
+          <p:cNvPr id="46" name="TextBox 45">
+            <a:extLst>
+              <a:ext uri="{FF2B5EF4-FFF2-40B4-BE49-F238E27FC236}">
+                <a16:creationId xmlns:a16="http://schemas.microsoft.com/office/drawing/2014/main" id="{515B7FB5-727E-810D-98A5-3AC7C6E6F6A3}"/>
+              </a:ext>
+            </a:extLst>
+          </p:cNvPr>
+          <p:cNvSpPr txBox="1"/>
+          <p:nvPr/>
+        </p:nvSpPr>
+        <p:spPr>
+          <a:xfrm>
+            <a:off x="2884503" y="2284254"/>
+            <a:ext cx="1670394" cy="553998"/>
+          </a:xfrm>
+          <a:prstGeom prst="rect">
+            <a:avLst/>
+          </a:prstGeom>
+          <a:noFill/>
+        </p:spPr>
+        <p:txBody>
+          <a:bodyPr wrap="none" rtlCol="0">
+            <a:spAutoFit/>
+          </a:bodyPr>
+          <a:lstStyle/>
+          <a:p>
+            <a:pPr algn="ctr"/>
+            <a:r>
+              <a:rPr lang="en-US"/>
+              <a:t>MODEL 2</a:t>
+            </a:r>
+          </a:p>
+          <a:p>
+            <a:pPr algn="ctr"/>
+            <a:r>
+              <a:rPr lang="en-US" sz="1200"/>
+              <a:t>Autoregressive LSTM</a:t>
+            </a:r>
+            <a:endParaRPr lang="en-US" sz="1200" dirty="0"/>
+          </a:p>
+        </p:txBody>
+      </p:sp>
+      <p:cxnSp>
+        <p:nvCxnSpPr>
+          <p:cNvPr id="47" name="Connector: Elbow 46">
+            <a:extLst>
+              <a:ext uri="{FF2B5EF4-FFF2-40B4-BE49-F238E27FC236}">
+                <a16:creationId xmlns:a16="http://schemas.microsoft.com/office/drawing/2014/main" id="{E1D07A76-4F84-AF28-2B76-0469C07C0C18}"/>
+              </a:ext>
+            </a:extLst>
+          </p:cNvPr>
+          <p:cNvCxnSpPr>
+            <a:cxnSpLocks/>
+            <a:stCxn id="43" idx="3"/>
+            <a:endCxn id="39" idx="3"/>
+          </p:cNvCxnSpPr>
+          <p:nvPr/>
+        </p:nvCxnSpPr>
+        <p:spPr>
+          <a:xfrm flipH="1">
+            <a:off x="4437745" y="3186897"/>
+            <a:ext cx="8724" cy="1192393"/>
+          </a:xfrm>
+          <a:prstGeom prst="bentConnector3">
+            <a:avLst>
+              <a:gd name="adj1" fmla="val -2620358"/>
+            </a:avLst>
+          </a:prstGeom>
+          <a:ln>
+            <a:tailEnd type="triangle"/>
+          </a:ln>
+        </p:spPr>
+        <p:style>
+          <a:lnRef idx="1">
+            <a:schemeClr val="accent1"/>
+          </a:lnRef>
+          <a:fillRef idx="0">
+            <a:schemeClr val="accent1"/>
+          </a:fillRef>
+          <a:effectRef idx="0">
+            <a:schemeClr val="accent1"/>
+          </a:effectRef>
+          <a:fontRef idx="minor">
+            <a:schemeClr val="tx1"/>
+          </a:fontRef>
+        </p:style>
+      </p:cxnSp>
+      <p:sp>
+        <p:nvSpPr>
+          <p:cNvPr id="48" name="Rectangle 47">
+            <a:extLst>
+              <a:ext uri="{FF2B5EF4-FFF2-40B4-BE49-F238E27FC236}">
+                <a16:creationId xmlns:a16="http://schemas.microsoft.com/office/drawing/2014/main" id="{4D0B2F1F-0EB6-D182-5608-D63898DAB094}"/>
+              </a:ext>
+            </a:extLst>
+          </p:cNvPr>
+          <p:cNvSpPr/>
+          <p:nvPr/>
+        </p:nvSpPr>
+        <p:spPr>
+          <a:xfrm>
+            <a:off x="5300456" y="4108830"/>
+            <a:ext cx="1491296" cy="540920"/>
+          </a:xfrm>
+          <a:prstGeom prst="rect">
+            <a:avLst/>
+          </a:prstGeom>
+        </p:spPr>
+        <p:style>
+          <a:lnRef idx="2">
+            <a:schemeClr val="accent1">
+              <a:shade val="15000"/>
+            </a:schemeClr>
+          </a:lnRef>
+          <a:fillRef idx="1">
+            <a:schemeClr val="accent1"/>
+          </a:fillRef>
+          <a:effectRef idx="0">
+            <a:schemeClr val="accent1"/>
+          </a:effectRef>
+          <a:fontRef idx="minor">
+            <a:schemeClr val="lt1"/>
+          </a:fontRef>
+        </p:style>
+        <p:txBody>
+          <a:bodyPr rtlCol="0" anchor="ctr"/>
+          <a:lstStyle/>
+          <a:p>
+            <a:pPr algn="ctr"/>
+            <a:r>
+              <a:rPr lang="en-US" sz="1200"/>
+              <a:t>n-layer LSTM</a:t>
+            </a:r>
+            <a:endParaRPr lang="en-US" sz="1200" dirty="0"/>
+          </a:p>
+        </p:txBody>
+      </p:sp>
+      <p:sp>
+        <p:nvSpPr>
+          <p:cNvPr id="49" name="Rectangle 48">
+            <a:extLst>
+              <a:ext uri="{FF2B5EF4-FFF2-40B4-BE49-F238E27FC236}">
+                <a16:creationId xmlns:a16="http://schemas.microsoft.com/office/drawing/2014/main" id="{50412F4F-405C-524F-4F1E-734055AA252F}"/>
+              </a:ext>
+            </a:extLst>
+          </p:cNvPr>
+          <p:cNvSpPr/>
+          <p:nvPr/>
+        </p:nvSpPr>
+        <p:spPr>
+          <a:xfrm>
+            <a:off x="5300456" y="3508025"/>
+            <a:ext cx="1491296" cy="358292"/>
+          </a:xfrm>
+          <a:prstGeom prst="rect">
+            <a:avLst/>
+          </a:prstGeom>
+        </p:spPr>
+        <p:style>
+          <a:lnRef idx="2">
+            <a:schemeClr val="accent1">
+              <a:shade val="15000"/>
+            </a:schemeClr>
+          </a:lnRef>
+          <a:fillRef idx="1">
+            <a:schemeClr val="accent1"/>
+          </a:fillRef>
+          <a:effectRef idx="0">
+            <a:schemeClr val="accent1"/>
+          </a:effectRef>
+          <a:fontRef idx="minor">
+            <a:schemeClr val="lt1"/>
+          </a:fontRef>
+        </p:style>
+        <p:txBody>
+          <a:bodyPr rtlCol="0" anchor="ctr"/>
+          <a:lstStyle/>
+          <a:p>
+            <a:pPr algn="ctr"/>
+            <a:r>
+              <a:rPr lang="en-US" sz="1200" dirty="0"/>
+              <a:t>Single-layer FF</a:t>
+            </a:r>
+          </a:p>
+        </p:txBody>
+      </p:sp>
+      <p:cxnSp>
+        <p:nvCxnSpPr>
+          <p:cNvPr id="50" name="Straight Arrow Connector 49">
+            <a:extLst>
+              <a:ext uri="{FF2B5EF4-FFF2-40B4-BE49-F238E27FC236}">
+                <a16:creationId xmlns:a16="http://schemas.microsoft.com/office/drawing/2014/main" id="{29962154-1940-DAC2-C55B-4B9164185CA7}"/>
+              </a:ext>
+            </a:extLst>
+          </p:cNvPr>
+          <p:cNvCxnSpPr>
+            <a:cxnSpLocks/>
+            <a:stCxn id="48" idx="0"/>
+            <a:endCxn id="49" idx="2"/>
+          </p:cNvCxnSpPr>
+          <p:nvPr/>
+        </p:nvCxnSpPr>
+        <p:spPr>
+          <a:xfrm flipV="1">
+            <a:off x="6046104" y="3866317"/>
+            <a:ext cx="0" cy="242513"/>
+          </a:xfrm>
+          <a:prstGeom prst="straightConnector1">
+            <a:avLst/>
+          </a:prstGeom>
+          <a:ln>
+            <a:tailEnd type="triangle"/>
+          </a:ln>
+        </p:spPr>
+        <p:style>
+          <a:lnRef idx="1">
+            <a:schemeClr val="accent1"/>
+          </a:lnRef>
+          <a:fillRef idx="0">
+            <a:schemeClr val="accent1"/>
+          </a:fillRef>
+          <a:effectRef idx="0">
+            <a:schemeClr val="accent1"/>
+          </a:effectRef>
+          <a:fontRef idx="minor">
+            <a:schemeClr val="tx1"/>
+          </a:fontRef>
+        </p:style>
+      </p:cxnSp>
+      <p:cxnSp>
+        <p:nvCxnSpPr>
+          <p:cNvPr id="51" name="Straight Arrow Connector 50">
+            <a:extLst>
+              <a:ext uri="{FF2B5EF4-FFF2-40B4-BE49-F238E27FC236}">
+                <a16:creationId xmlns:a16="http://schemas.microsoft.com/office/drawing/2014/main" id="{AF6B2527-2DBF-02DB-C5DB-4EADF96F6EA2}"/>
+              </a:ext>
+            </a:extLst>
+          </p:cNvPr>
+          <p:cNvCxnSpPr>
+            <a:cxnSpLocks/>
+            <a:stCxn id="49" idx="0"/>
+            <a:endCxn id="52" idx="2"/>
+          </p:cNvCxnSpPr>
+          <p:nvPr/>
+        </p:nvCxnSpPr>
+        <p:spPr>
+          <a:xfrm flipH="1" flipV="1">
+            <a:off x="6046103" y="3325396"/>
+            <a:ext cx="1" cy="182629"/>
+          </a:xfrm>
+          <a:prstGeom prst="straightConnector1">
+            <a:avLst/>
+          </a:prstGeom>
+          <a:ln>
+            <a:tailEnd type="triangle"/>
+          </a:ln>
+        </p:spPr>
+        <p:style>
+          <a:lnRef idx="1">
+            <a:schemeClr val="accent1"/>
+          </a:lnRef>
+          <a:fillRef idx="0">
+            <a:schemeClr val="accent1"/>
+          </a:fillRef>
+          <a:effectRef idx="0">
+            <a:schemeClr val="accent1"/>
+          </a:effectRef>
+          <a:fontRef idx="minor">
+            <a:schemeClr val="tx1"/>
+          </a:fontRef>
+        </p:style>
+      </p:cxnSp>
+      <p:sp>
+        <p:nvSpPr>
+          <p:cNvPr id="52" name="TextBox 51">
+            <a:extLst>
+              <a:ext uri="{FF2B5EF4-FFF2-40B4-BE49-F238E27FC236}">
+                <a16:creationId xmlns:a16="http://schemas.microsoft.com/office/drawing/2014/main" id="{59C7CF45-C60A-BE04-9B1A-8E38433CE750}"/>
+              </a:ext>
+            </a:extLst>
+          </p:cNvPr>
+          <p:cNvSpPr txBox="1"/>
+          <p:nvPr/>
+        </p:nvSpPr>
+        <p:spPr>
+          <a:xfrm>
+            <a:off x="5291730" y="3048397"/>
+            <a:ext cx="1508746" cy="276999"/>
+          </a:xfrm>
+          <a:prstGeom prst="rect">
+            <a:avLst/>
+          </a:prstGeom>
+          <a:noFill/>
+        </p:spPr>
+        <p:txBody>
+          <a:bodyPr wrap="none" rtlCol="0">
+            <a:spAutoFit/>
+          </a:bodyPr>
+          <a:lstStyle/>
+          <a:p>
+            <a:r>
+              <a:rPr lang="en-US" sz="1200" dirty="0"/>
+              <a:t>[predicted release]</a:t>
+            </a:r>
+          </a:p>
+        </p:txBody>
+      </p:sp>
+      <p:sp>
+        <p:nvSpPr>
+          <p:cNvPr id="53" name="TextBox 52">
+            <a:extLst>
+              <a:ext uri="{FF2B5EF4-FFF2-40B4-BE49-F238E27FC236}">
+                <a16:creationId xmlns:a16="http://schemas.microsoft.com/office/drawing/2014/main" id="{4D0BC126-E33F-9922-C223-205E53675AD8}"/>
+              </a:ext>
+            </a:extLst>
+          </p:cNvPr>
+          <p:cNvSpPr txBox="1"/>
+          <p:nvPr/>
+        </p:nvSpPr>
+        <p:spPr>
+          <a:xfrm>
+            <a:off x="5493388" y="4794170"/>
+            <a:ext cx="1105431" cy="276999"/>
+          </a:xfrm>
+          <a:prstGeom prst="rect">
+            <a:avLst/>
+          </a:prstGeom>
+          <a:noFill/>
+        </p:spPr>
+        <p:txBody>
+          <a:bodyPr wrap="none" rtlCol="0">
+            <a:spAutoFit/>
+          </a:bodyPr>
+          <a:lstStyle/>
+          <a:p>
+            <a:r>
+              <a:rPr lang="en-US" sz="1200" dirty="0"/>
+              <a:t>[inflow, DOY]</a:t>
+            </a:r>
+          </a:p>
+        </p:txBody>
+      </p:sp>
+      <p:cxnSp>
+        <p:nvCxnSpPr>
+          <p:cNvPr id="54" name="Straight Arrow Connector 53">
+            <a:extLst>
+              <a:ext uri="{FF2B5EF4-FFF2-40B4-BE49-F238E27FC236}">
+                <a16:creationId xmlns:a16="http://schemas.microsoft.com/office/drawing/2014/main" id="{C408C0DC-29BB-E8DF-7E7C-3068EAE06217}"/>
+              </a:ext>
+            </a:extLst>
+          </p:cNvPr>
+          <p:cNvCxnSpPr>
+            <a:cxnSpLocks/>
+            <a:stCxn id="53" idx="0"/>
+            <a:endCxn id="48" idx="2"/>
+          </p:cNvCxnSpPr>
+          <p:nvPr/>
+        </p:nvCxnSpPr>
+        <p:spPr>
+          <a:xfrm flipV="1">
+            <a:off x="6046104" y="4649750"/>
+            <a:ext cx="0" cy="144420"/>
+          </a:xfrm>
+          <a:prstGeom prst="straightConnector1">
+            <a:avLst/>
+          </a:prstGeom>
+          <a:ln>
+            <a:tailEnd type="triangle"/>
+          </a:ln>
+        </p:spPr>
+        <p:style>
+          <a:lnRef idx="1">
+            <a:schemeClr val="accent1"/>
+          </a:lnRef>
+          <a:fillRef idx="0">
+            <a:schemeClr val="accent1"/>
+          </a:fillRef>
+          <a:effectRef idx="0">
+            <a:schemeClr val="accent1"/>
+          </a:effectRef>
+          <a:fontRef idx="minor">
+            <a:schemeClr val="tx1"/>
+          </a:fontRef>
+        </p:style>
+      </p:cxnSp>
+      <p:sp>
+        <p:nvSpPr>
+          <p:cNvPr id="55" name="TextBox 54">
+            <a:extLst>
+              <a:ext uri="{FF2B5EF4-FFF2-40B4-BE49-F238E27FC236}">
+                <a16:creationId xmlns:a16="http://schemas.microsoft.com/office/drawing/2014/main" id="{068DC0FF-6531-B687-91ED-0CDD1D754E07}"/>
+              </a:ext>
+            </a:extLst>
+          </p:cNvPr>
+          <p:cNvSpPr txBox="1"/>
+          <p:nvPr/>
+        </p:nvSpPr>
+        <p:spPr>
+          <a:xfrm>
+            <a:off x="5233578" y="2277976"/>
+            <a:ext cx="2317942" cy="553998"/>
+          </a:xfrm>
+          <a:prstGeom prst="rect">
+            <a:avLst/>
+          </a:prstGeom>
+          <a:noFill/>
+        </p:spPr>
+        <p:txBody>
+          <a:bodyPr wrap="none" rtlCol="0">
+            <a:spAutoFit/>
+          </a:bodyPr>
+          <a:lstStyle/>
+          <a:p>
+            <a:pPr algn="ctr"/>
+            <a:r>
+              <a:rPr lang="en-US" dirty="0"/>
+              <a:t>MODEL 3</a:t>
+            </a:r>
+          </a:p>
+          <a:p>
+            <a:pPr algn="ctr"/>
+            <a:r>
+              <a:rPr lang="en-US" sz="1200" dirty="0"/>
+              <a:t>LSTM with Accumulated Storage</a:t>
+            </a:r>
+          </a:p>
+        </p:txBody>
+      </p:sp>
+      <p:cxnSp>
+        <p:nvCxnSpPr>
+          <p:cNvPr id="56" name="Connector: Elbow 55">
+            <a:extLst>
+              <a:ext uri="{FF2B5EF4-FFF2-40B4-BE49-F238E27FC236}">
+                <a16:creationId xmlns:a16="http://schemas.microsoft.com/office/drawing/2014/main" id="{66093733-BEFC-A1F0-AE61-29F41C410271}"/>
+              </a:ext>
+            </a:extLst>
+          </p:cNvPr>
+          <p:cNvCxnSpPr>
+            <a:cxnSpLocks/>
+            <a:stCxn id="52" idx="3"/>
+            <a:endCxn id="57" idx="0"/>
+          </p:cNvCxnSpPr>
+          <p:nvPr/>
+        </p:nvCxnSpPr>
+        <p:spPr>
+          <a:xfrm>
+            <a:off x="6800476" y="3186897"/>
+            <a:ext cx="1001203" cy="869227"/>
+          </a:xfrm>
+          <a:prstGeom prst="bentConnector2">
+            <a:avLst/>
+          </a:prstGeom>
+          <a:ln>
+            <a:tailEnd type="triangle"/>
+          </a:ln>
+        </p:spPr>
+        <p:style>
+          <a:lnRef idx="1">
+            <a:schemeClr val="accent1"/>
+          </a:lnRef>
+          <a:fillRef idx="0">
+            <a:schemeClr val="accent1"/>
+          </a:fillRef>
+          <a:effectRef idx="0">
+            <a:schemeClr val="accent1"/>
+          </a:effectRef>
+          <a:fontRef idx="minor">
+            <a:schemeClr val="tx1"/>
+          </a:fontRef>
+        </p:style>
+      </p:cxnSp>
+      <p:sp>
+        <p:nvSpPr>
+          <p:cNvPr id="57" name="TextBox 56">
+            <a:extLst>
+              <a:ext uri="{FF2B5EF4-FFF2-40B4-BE49-F238E27FC236}">
+                <a16:creationId xmlns:a16="http://schemas.microsoft.com/office/drawing/2014/main" id="{C3053513-DEE4-7CC5-8BBF-9EBD9ECAA846}"/>
+              </a:ext>
+            </a:extLst>
+          </p:cNvPr>
+          <p:cNvSpPr txBox="1"/>
+          <p:nvPr/>
+        </p:nvSpPr>
+        <p:spPr>
+          <a:xfrm>
+            <a:off x="7025693" y="4056124"/>
+            <a:ext cx="1551972" cy="646331"/>
+          </a:xfrm>
+          <a:prstGeom prst="rect">
+            <a:avLst/>
+          </a:prstGeom>
+          <a:noFill/>
+          <a:ln>
+            <a:solidFill>
+              <a:schemeClr val="accent1"/>
+            </a:solidFill>
+          </a:ln>
+        </p:spPr>
+        <p:txBody>
+          <a:bodyPr wrap="square" rtlCol="0">
+            <a:spAutoFit/>
+          </a:bodyPr>
+          <a:lstStyle/>
+          <a:p>
+            <a:r>
+              <a:rPr lang="en-US" sz="1200" dirty="0" err="1"/>
+              <a:t>storage</a:t>
+            </a:r>
+            <a:r>
+              <a:rPr lang="en-US" sz="1200" i="0" baseline="-25000" dirty="0" err="1">
+                <a:latin typeface="+mj-lt"/>
+              </a:rPr>
+              <a:t>i</a:t>
+            </a:r>
+            <a:r>
+              <a:rPr lang="en-US" sz="1200" dirty="0"/>
+              <a:t> = </a:t>
+            </a:r>
+          </a:p>
+          <a:p>
+            <a:r>
+              <a:rPr lang="en-US" sz="1200" dirty="0"/>
+              <a:t>storage</a:t>
+            </a:r>
+            <a:r>
+              <a:rPr lang="en-US" sz="1200" baseline="-25000" dirty="0"/>
+              <a:t>i-1 </a:t>
+            </a:r>
+            <a:r>
+              <a:rPr lang="en-US" sz="1200" dirty="0"/>
+              <a:t>– release</a:t>
+            </a:r>
+            <a:r>
+              <a:rPr lang="en-US" sz="1200" baseline="-25000" dirty="0"/>
+              <a:t>i-1 </a:t>
+            </a:r>
+            <a:r>
+              <a:rPr lang="en-US" sz="1200" dirty="0"/>
+              <a:t>+ </a:t>
+            </a:r>
+            <a:r>
+              <a:rPr lang="en-US" sz="1200" dirty="0" err="1"/>
+              <a:t>inflow</a:t>
+            </a:r>
+            <a:r>
+              <a:rPr lang="en-US" sz="1200" baseline="-25000" dirty="0" err="1"/>
+              <a:t>i</a:t>
+            </a:r>
+            <a:endParaRPr lang="en-US" sz="1200" baseline="-25000" dirty="0"/>
+          </a:p>
+        </p:txBody>
+      </p:sp>
+      <p:cxnSp>
+        <p:nvCxnSpPr>
+          <p:cNvPr id="58" name="Straight Arrow Connector 57">
+            <a:extLst>
+              <a:ext uri="{FF2B5EF4-FFF2-40B4-BE49-F238E27FC236}">
+                <a16:creationId xmlns:a16="http://schemas.microsoft.com/office/drawing/2014/main" id="{98FBA0BD-5FB1-9871-23D5-1903FFC04B81}"/>
+              </a:ext>
+            </a:extLst>
+          </p:cNvPr>
+          <p:cNvCxnSpPr>
+            <a:cxnSpLocks/>
+            <a:stCxn id="57" idx="1"/>
+            <a:endCxn id="48" idx="3"/>
+          </p:cNvCxnSpPr>
+          <p:nvPr/>
+        </p:nvCxnSpPr>
+        <p:spPr>
+          <a:xfrm flipH="1">
+            <a:off x="6791752" y="4379290"/>
+            <a:ext cx="233941" cy="0"/>
+          </a:xfrm>
+          <a:prstGeom prst="straightConnector1">
+            <a:avLst/>
+          </a:prstGeom>
+          <a:ln>
+            <a:tailEnd type="triangle"/>
+          </a:ln>
+        </p:spPr>
+        <p:style>
+          <a:lnRef idx="1">
+            <a:schemeClr val="accent1"/>
+          </a:lnRef>
+          <a:fillRef idx="0">
+            <a:schemeClr val="accent1"/>
+          </a:fillRef>
+          <a:effectRef idx="0">
+            <a:schemeClr val="accent1"/>
+          </a:effectRef>
+          <a:fontRef idx="minor">
+            <a:schemeClr val="tx1"/>
+          </a:fontRef>
+        </p:style>
+      </p:cxnSp>
+      <p:sp>
+        <p:nvSpPr>
+          <p:cNvPr id="7" name="Rectangle 6">
+            <a:extLst>
+              <a:ext uri="{FF2B5EF4-FFF2-40B4-BE49-F238E27FC236}">
+                <a16:creationId xmlns:a16="http://schemas.microsoft.com/office/drawing/2014/main" id="{D57FF325-A1DE-9571-5FB4-9A0C39261F7E}"/>
+              </a:ext>
+            </a:extLst>
+          </p:cNvPr>
+          <p:cNvSpPr/>
+          <p:nvPr/>
+        </p:nvSpPr>
+        <p:spPr>
+          <a:xfrm>
+            <a:off x="8710039" y="3508025"/>
+            <a:ext cx="1491296" cy="358292"/>
+          </a:xfrm>
+          <a:prstGeom prst="rect">
+            <a:avLst/>
+          </a:prstGeom>
+        </p:spPr>
+        <p:style>
+          <a:lnRef idx="2">
+            <a:schemeClr val="accent1">
+              <a:shade val="15000"/>
+            </a:schemeClr>
+          </a:lnRef>
+          <a:fillRef idx="1">
+            <a:schemeClr val="accent1"/>
+          </a:fillRef>
+          <a:effectRef idx="0">
+            <a:schemeClr val="accent1"/>
+          </a:effectRef>
+          <a:fontRef idx="minor">
+            <a:schemeClr val="lt1"/>
+          </a:fontRef>
+        </p:style>
+        <p:txBody>
+          <a:bodyPr rtlCol="0" anchor="ctr"/>
+          <a:lstStyle/>
+          <a:p>
+            <a:pPr algn="ctr"/>
+            <a:r>
+              <a:rPr lang="en-US" sz="1200" dirty="0"/>
+              <a:t>Single-layer FF</a:t>
+            </a:r>
+          </a:p>
+        </p:txBody>
+      </p:sp>
+      <p:cxnSp>
+        <p:nvCxnSpPr>
+          <p:cNvPr id="9" name="Straight Arrow Connector 8">
+            <a:extLst>
+              <a:ext uri="{FF2B5EF4-FFF2-40B4-BE49-F238E27FC236}">
+                <a16:creationId xmlns:a16="http://schemas.microsoft.com/office/drawing/2014/main" id="{B4D6FA2D-2564-C120-1B94-6BB191F7E081}"/>
+              </a:ext>
+            </a:extLst>
+          </p:cNvPr>
+          <p:cNvCxnSpPr>
+            <a:cxnSpLocks/>
+            <a:stCxn id="7" idx="0"/>
+            <a:endCxn id="10" idx="2"/>
+          </p:cNvCxnSpPr>
+          <p:nvPr/>
+        </p:nvCxnSpPr>
+        <p:spPr>
+          <a:xfrm flipV="1">
+            <a:off x="9455687" y="3328094"/>
+            <a:ext cx="0" cy="179931"/>
+          </a:xfrm>
+          <a:prstGeom prst="straightConnector1">
+            <a:avLst/>
+          </a:prstGeom>
+          <a:ln>
+            <a:tailEnd type="triangle"/>
+          </a:ln>
+        </p:spPr>
+        <p:style>
+          <a:lnRef idx="1">
+            <a:schemeClr val="accent1"/>
+          </a:lnRef>
+          <a:fillRef idx="0">
+            <a:schemeClr val="accent1"/>
+          </a:fillRef>
+          <a:effectRef idx="0">
+            <a:schemeClr val="accent1"/>
+          </a:effectRef>
+          <a:fontRef idx="minor">
+            <a:schemeClr val="tx1"/>
+          </a:fontRef>
+        </p:style>
+      </p:cxnSp>
+      <p:sp>
+        <p:nvSpPr>
+          <p:cNvPr id="10" name="TextBox 9">
+            <a:extLst>
+              <a:ext uri="{FF2B5EF4-FFF2-40B4-BE49-F238E27FC236}">
+                <a16:creationId xmlns:a16="http://schemas.microsoft.com/office/drawing/2014/main" id="{BCCEB21E-B210-BD43-2DA8-59656357A5B8}"/>
+              </a:ext>
+            </a:extLst>
+          </p:cNvPr>
+          <p:cNvSpPr txBox="1"/>
+          <p:nvPr/>
+        </p:nvSpPr>
+        <p:spPr>
+          <a:xfrm>
+            <a:off x="8701314" y="3051095"/>
+            <a:ext cx="1508746" cy="276999"/>
+          </a:xfrm>
+          <a:prstGeom prst="rect">
+            <a:avLst/>
+          </a:prstGeom>
+          <a:noFill/>
+        </p:spPr>
+        <p:txBody>
+          <a:bodyPr wrap="none" rtlCol="0">
+            <a:spAutoFit/>
+          </a:bodyPr>
+          <a:lstStyle/>
+          <a:p>
+            <a:r>
+              <a:rPr lang="en-US" sz="1200" dirty="0"/>
+              <a:t>[predicted release]</a:t>
+            </a:r>
+          </a:p>
+        </p:txBody>
+      </p:sp>
+      <p:sp>
+        <p:nvSpPr>
+          <p:cNvPr id="11" name="TextBox 10">
+            <a:extLst>
+              <a:ext uri="{FF2B5EF4-FFF2-40B4-BE49-F238E27FC236}">
+                <a16:creationId xmlns:a16="http://schemas.microsoft.com/office/drawing/2014/main" id="{E8933867-697F-EA7D-0FCD-386918C79E85}"/>
+              </a:ext>
+            </a:extLst>
+          </p:cNvPr>
+          <p:cNvSpPr txBox="1"/>
+          <p:nvPr/>
+        </p:nvSpPr>
+        <p:spPr>
+          <a:xfrm>
+            <a:off x="8709587" y="4794170"/>
+            <a:ext cx="1105431" cy="276999"/>
+          </a:xfrm>
+          <a:prstGeom prst="rect">
+            <a:avLst/>
+          </a:prstGeom>
+          <a:noFill/>
+        </p:spPr>
+        <p:txBody>
+          <a:bodyPr wrap="square" rtlCol="0">
+            <a:spAutoFit/>
+          </a:bodyPr>
+          <a:lstStyle/>
+          <a:p>
+            <a:r>
+              <a:rPr lang="en-US" sz="1200" dirty="0"/>
+              <a:t>[inflow, DOY]</a:t>
+            </a:r>
+          </a:p>
+        </p:txBody>
+      </p:sp>
+      <p:cxnSp>
+        <p:nvCxnSpPr>
+          <p:cNvPr id="12" name="Straight Arrow Connector 11">
+            <a:extLst>
+              <a:ext uri="{FF2B5EF4-FFF2-40B4-BE49-F238E27FC236}">
+                <a16:creationId xmlns:a16="http://schemas.microsoft.com/office/drawing/2014/main" id="{3C80EC9D-4462-D7B5-5BF3-94984CADCC12}"/>
+              </a:ext>
+            </a:extLst>
+          </p:cNvPr>
+          <p:cNvCxnSpPr>
+            <a:cxnSpLocks/>
+            <a:stCxn id="11" idx="0"/>
+          </p:cNvCxnSpPr>
+          <p:nvPr/>
+        </p:nvCxnSpPr>
+        <p:spPr>
+          <a:xfrm flipV="1">
+            <a:off x="9262303" y="3866317"/>
+            <a:ext cx="0" cy="927853"/>
+          </a:xfrm>
+          <a:prstGeom prst="straightConnector1">
+            <a:avLst/>
+          </a:prstGeom>
+          <a:ln>
+            <a:tailEnd type="triangle"/>
+          </a:ln>
+        </p:spPr>
+        <p:style>
+          <a:lnRef idx="1">
+            <a:schemeClr val="accent1"/>
+          </a:lnRef>
+          <a:fillRef idx="0">
+            <a:schemeClr val="accent1"/>
+          </a:fillRef>
+          <a:effectRef idx="0">
+            <a:schemeClr val="accent1"/>
+          </a:effectRef>
+          <a:fontRef idx="minor">
+            <a:schemeClr val="tx1"/>
+          </a:fontRef>
+        </p:style>
+      </p:cxnSp>
+      <p:sp>
+        <p:nvSpPr>
+          <p:cNvPr id="13" name="TextBox 12">
+            <a:extLst>
+              <a:ext uri="{FF2B5EF4-FFF2-40B4-BE49-F238E27FC236}">
+                <a16:creationId xmlns:a16="http://schemas.microsoft.com/office/drawing/2014/main" id="{9C931B6E-8DDC-2AD1-A973-0560DA2729EB}"/>
+              </a:ext>
+            </a:extLst>
+          </p:cNvPr>
+          <p:cNvSpPr txBox="1"/>
+          <p:nvPr/>
+        </p:nvSpPr>
+        <p:spPr>
+          <a:xfrm>
+            <a:off x="8552776" y="2285784"/>
+            <a:ext cx="2272802" cy="553998"/>
+          </a:xfrm>
+          <a:prstGeom prst="rect">
+            <a:avLst/>
+          </a:prstGeom>
+          <a:noFill/>
+        </p:spPr>
+        <p:txBody>
+          <a:bodyPr wrap="none" rtlCol="0">
+            <a:spAutoFit/>
+          </a:bodyPr>
+          <a:lstStyle/>
+          <a:p>
+            <a:pPr algn="ctr"/>
+            <a:r>
+              <a:rPr lang="en-US" dirty="0"/>
+              <a:t>MODEL 4</a:t>
+            </a:r>
+          </a:p>
+          <a:p>
+            <a:pPr algn="ctr"/>
+            <a:r>
+              <a:rPr lang="en-US" sz="1200" dirty="0"/>
+              <a:t>RNN with Accumulated Storage</a:t>
+            </a:r>
+          </a:p>
+        </p:txBody>
+      </p:sp>
+      <p:cxnSp>
+        <p:nvCxnSpPr>
+          <p:cNvPr id="14" name="Connector: Elbow 13">
+            <a:extLst>
+              <a:ext uri="{FF2B5EF4-FFF2-40B4-BE49-F238E27FC236}">
+                <a16:creationId xmlns:a16="http://schemas.microsoft.com/office/drawing/2014/main" id="{6C07031D-E5D9-D43E-41EF-8FC12CFA61D6}"/>
+              </a:ext>
+            </a:extLst>
+          </p:cNvPr>
+          <p:cNvCxnSpPr>
+            <a:cxnSpLocks/>
+            <a:stCxn id="10" idx="3"/>
+            <a:endCxn id="15" idx="0"/>
+          </p:cNvCxnSpPr>
+          <p:nvPr/>
+        </p:nvCxnSpPr>
+        <p:spPr>
+          <a:xfrm>
+            <a:off x="10210060" y="3189595"/>
+            <a:ext cx="255103" cy="886646"/>
+          </a:xfrm>
+          <a:prstGeom prst="bentConnector2">
+            <a:avLst/>
+          </a:prstGeom>
+          <a:ln>
+            <a:tailEnd type="triangle"/>
+          </a:ln>
+        </p:spPr>
+        <p:style>
+          <a:lnRef idx="1">
+            <a:schemeClr val="accent1"/>
+          </a:lnRef>
+          <a:fillRef idx="0">
+            <a:schemeClr val="accent1"/>
+          </a:fillRef>
+          <a:effectRef idx="0">
+            <a:schemeClr val="accent1"/>
+          </a:effectRef>
+          <a:fontRef idx="minor">
+            <a:schemeClr val="tx1"/>
+          </a:fontRef>
+        </p:style>
+      </p:cxnSp>
+      <p:sp>
+        <p:nvSpPr>
+          <p:cNvPr id="15" name="TextBox 14">
+            <a:extLst>
+              <a:ext uri="{FF2B5EF4-FFF2-40B4-BE49-F238E27FC236}">
+                <a16:creationId xmlns:a16="http://schemas.microsoft.com/office/drawing/2014/main" id="{A7F88AE8-5B45-6A29-B30E-C242C5E10A4D}"/>
+              </a:ext>
+            </a:extLst>
+          </p:cNvPr>
+          <p:cNvSpPr txBox="1"/>
+          <p:nvPr/>
+        </p:nvSpPr>
+        <p:spPr>
+          <a:xfrm>
+            <a:off x="9689177" y="4076241"/>
+            <a:ext cx="1551972" cy="646331"/>
+          </a:xfrm>
+          <a:prstGeom prst="rect">
+            <a:avLst/>
+          </a:prstGeom>
+          <a:noFill/>
+          <a:ln>
+            <a:solidFill>
+              <a:schemeClr val="accent1"/>
+            </a:solidFill>
+          </a:ln>
+        </p:spPr>
+        <p:txBody>
+          <a:bodyPr wrap="square" rtlCol="0">
+            <a:spAutoFit/>
+          </a:bodyPr>
+          <a:lstStyle/>
+          <a:p>
+            <a:r>
+              <a:rPr lang="en-US" sz="1200" dirty="0" err="1"/>
+              <a:t>storage</a:t>
+            </a:r>
+            <a:r>
+              <a:rPr lang="en-US" sz="1200" i="0" baseline="-25000" dirty="0" err="1">
+                <a:latin typeface="+mj-lt"/>
+              </a:rPr>
+              <a:t>i</a:t>
+            </a:r>
+            <a:r>
+              <a:rPr lang="en-US" sz="1200" dirty="0"/>
+              <a:t> = </a:t>
+            </a:r>
+          </a:p>
+          <a:p>
+            <a:r>
+              <a:rPr lang="en-US" sz="1200" dirty="0"/>
+              <a:t>storage</a:t>
+            </a:r>
+            <a:r>
+              <a:rPr lang="en-US" sz="1200" baseline="-25000" dirty="0"/>
+              <a:t>i-1 </a:t>
+            </a:r>
+            <a:r>
+              <a:rPr lang="en-US" sz="1200" dirty="0"/>
+              <a:t>– release</a:t>
+            </a:r>
+            <a:r>
+              <a:rPr lang="en-US" sz="1200" baseline="-25000" dirty="0"/>
+              <a:t>i-1 </a:t>
+            </a:r>
+            <a:r>
+              <a:rPr lang="en-US" sz="1200" dirty="0"/>
+              <a:t>+ </a:t>
+            </a:r>
+            <a:r>
+              <a:rPr lang="en-US" sz="1200" dirty="0" err="1"/>
+              <a:t>inflow</a:t>
+            </a:r>
+            <a:r>
+              <a:rPr lang="en-US" sz="1200" baseline="-25000" dirty="0" err="1"/>
+              <a:t>i</a:t>
+            </a:r>
+            <a:endParaRPr lang="en-US" sz="1200" baseline="-25000" dirty="0"/>
+          </a:p>
+        </p:txBody>
+      </p:sp>
+      <p:cxnSp>
+        <p:nvCxnSpPr>
+          <p:cNvPr id="16" name="Straight Arrow Connector 15">
+            <a:extLst>
+              <a:ext uri="{FF2B5EF4-FFF2-40B4-BE49-F238E27FC236}">
+                <a16:creationId xmlns:a16="http://schemas.microsoft.com/office/drawing/2014/main" id="{CED7707E-0839-9A19-3B25-E111FC436732}"/>
+              </a:ext>
+            </a:extLst>
+          </p:cNvPr>
+          <p:cNvCxnSpPr>
+            <a:cxnSpLocks/>
+          </p:cNvCxnSpPr>
+          <p:nvPr/>
+        </p:nvCxnSpPr>
+        <p:spPr>
+          <a:xfrm flipV="1">
+            <a:off x="9966720" y="3866317"/>
+            <a:ext cx="0" cy="209924"/>
+          </a:xfrm>
+          <a:prstGeom prst="straightConnector1">
+            <a:avLst/>
+          </a:prstGeom>
+          <a:ln>
+            <a:tailEnd type="triangle"/>
+          </a:ln>
+        </p:spPr>
+        <p:style>
+          <a:lnRef idx="1">
+            <a:schemeClr val="accent1"/>
+          </a:lnRef>
+          <a:fillRef idx="0">
+            <a:schemeClr val="accent1"/>
+          </a:fillRef>
+          <a:effectRef idx="0">
+            <a:schemeClr val="accent1"/>
+          </a:effectRef>
+          <a:fontRef idx="minor">
+            <a:schemeClr val="tx1"/>
+          </a:fontRef>
+        </p:style>
+      </p:cxnSp>
+    </p:spTree>
+    <p:extLst>
+      <p:ext uri="{BB962C8B-B14F-4D97-AF65-F5344CB8AC3E}">
+        <p14:creationId xmlns:p14="http://schemas.microsoft.com/office/powerpoint/2010/main" val="1622329642"/>
       </p:ext>
     </p:extLst>
   </p:cSld>

</xml_diff>